<commit_message>
Inserted fields into WSR
</commit_message>
<xml_diff>
--- a/wsr/StatusPres.pptx
+++ b/wsr/StatusPres.pptx
@@ -230,6 +230,22 @@
       </a:defRPr>
     </a:lvl9pPr>
   </p:defaultTextStyle>
+  <p:extLst>
+    <p:ext uri="{EFAFB233-063F-42B5-8137-9DF3F51BA10A}">
+      <p15:sldGuideLst xmlns:p15="http://schemas.microsoft.com/office/powerpoint/2012/main">
+        <p15:guide id="1" orient="horz" pos="1620">
+          <p15:clr>
+            <a:srgbClr val="A4A3A4"/>
+          </p15:clr>
+        </p15:guide>
+        <p15:guide id="2" pos="2880">
+          <p15:clr>
+            <a:srgbClr val="A4A3A4"/>
+          </p15:clr>
+        </p15:guide>
+      </p15:sldGuideLst>
+    </p:ext>
+  </p:extLst>
 </p:presentation>
 </file>
 
@@ -524,8 +540,8 @@
         </p:nvSpPr>
         <p:spPr>
           <a:xfrm>
-            <a:off x="381187" y="685800"/>
-            <a:ext cx="6096299" cy="3429000"/>
+            <a:off x="381000" y="685800"/>
+            <a:ext cx="6096000" cy="3429000"/>
           </a:xfrm>
           <a:custGeom>
             <a:avLst/>
@@ -599,6 +615,11 @@
         </p:txBody>
       </p:sp>
     </p:spTree>
+    <p:extLst>
+      <p:ext uri="{BB962C8B-B14F-4D97-AF65-F5344CB8AC3E}">
+        <p14:creationId xmlns:p14="http://schemas.microsoft.com/office/powerpoint/2010/main" val="3645044577"/>
+      </p:ext>
+    </p:extLst>
   </p:cSld>
   <p:clrMapOvr>
     <a:masterClrMapping/>
@@ -635,8 +656,8 @@
         </p:nvSpPr>
         <p:spPr>
           <a:xfrm>
-            <a:off x="381187" y="685800"/>
-            <a:ext cx="6096299" cy="3429000"/>
+            <a:off x="381000" y="685800"/>
+            <a:ext cx="6096000" cy="3429000"/>
           </a:xfrm>
           <a:custGeom>
             <a:avLst/>
@@ -710,6 +731,11 @@
         </p:txBody>
       </p:sp>
     </p:spTree>
+    <p:extLst>
+      <p:ext uri="{BB962C8B-B14F-4D97-AF65-F5344CB8AC3E}">
+        <p14:creationId xmlns:p14="http://schemas.microsoft.com/office/powerpoint/2010/main" val="808428391"/>
+      </p:ext>
+    </p:extLst>
   </p:cSld>
   <p:clrMapOvr>
     <a:masterClrMapping/>
@@ -746,8 +772,8 @@
         </p:nvSpPr>
         <p:spPr>
           <a:xfrm>
-            <a:off x="381187" y="685800"/>
-            <a:ext cx="6096299" cy="3429000"/>
+            <a:off x="381000" y="685800"/>
+            <a:ext cx="6096000" cy="3429000"/>
           </a:xfrm>
           <a:custGeom>
             <a:avLst/>
@@ -821,6 +847,11 @@
         </p:txBody>
       </p:sp>
     </p:spTree>
+    <p:extLst>
+      <p:ext uri="{BB962C8B-B14F-4D97-AF65-F5344CB8AC3E}">
+        <p14:creationId xmlns:p14="http://schemas.microsoft.com/office/powerpoint/2010/main" val="1088200188"/>
+      </p:ext>
+    </p:extLst>
   </p:cSld>
   <p:clrMapOvr>
     <a:masterClrMapping/>
@@ -857,8 +888,8 @@
         </p:nvSpPr>
         <p:spPr>
           <a:xfrm>
-            <a:off x="381187" y="685800"/>
-            <a:ext cx="6096299" cy="3429000"/>
+            <a:off x="381000" y="685800"/>
+            <a:ext cx="6096000" cy="3429000"/>
           </a:xfrm>
           <a:custGeom>
             <a:avLst/>
@@ -932,6 +963,11 @@
         </p:txBody>
       </p:sp>
     </p:spTree>
+    <p:extLst>
+      <p:ext uri="{BB962C8B-B14F-4D97-AF65-F5344CB8AC3E}">
+        <p14:creationId xmlns:p14="http://schemas.microsoft.com/office/powerpoint/2010/main" val="3932688121"/>
+      </p:ext>
+    </p:extLst>
   </p:cSld>
   <p:clrMapOvr>
     <a:masterClrMapping/>
@@ -968,8 +1004,8 @@
         </p:nvSpPr>
         <p:spPr>
           <a:xfrm>
-            <a:off x="381187" y="685800"/>
-            <a:ext cx="6096299" cy="3429000"/>
+            <a:off x="381000" y="685800"/>
+            <a:ext cx="6096000" cy="3429000"/>
           </a:xfrm>
           <a:custGeom>
             <a:avLst/>
@@ -1043,6 +1079,11 @@
         </p:txBody>
       </p:sp>
     </p:spTree>
+    <p:extLst>
+      <p:ext uri="{BB962C8B-B14F-4D97-AF65-F5344CB8AC3E}">
+        <p14:creationId xmlns:p14="http://schemas.microsoft.com/office/powerpoint/2010/main" val="3023507304"/>
+      </p:ext>
+    </p:extLst>
   </p:cSld>
   <p:clrMapOvr>
     <a:masterClrMapping/>
@@ -1079,8 +1120,8 @@
         </p:nvSpPr>
         <p:spPr>
           <a:xfrm>
-            <a:off x="381187" y="685800"/>
-            <a:ext cx="6096299" cy="3429000"/>
+            <a:off x="381000" y="685800"/>
+            <a:ext cx="6096000" cy="3429000"/>
           </a:xfrm>
           <a:custGeom>
             <a:avLst/>
@@ -1154,6 +1195,11 @@
         </p:txBody>
       </p:sp>
     </p:spTree>
+    <p:extLst>
+      <p:ext uri="{BB962C8B-B14F-4D97-AF65-F5344CB8AC3E}">
+        <p14:creationId xmlns:p14="http://schemas.microsoft.com/office/powerpoint/2010/main" val="1542522373"/>
+      </p:ext>
+    </p:extLst>
   </p:cSld>
   <p:clrMapOvr>
     <a:masterClrMapping/>
@@ -1190,8 +1236,8 @@
         </p:nvSpPr>
         <p:spPr>
           <a:xfrm>
-            <a:off x="381187" y="685800"/>
-            <a:ext cx="6096299" cy="3429000"/>
+            <a:off x="381000" y="685800"/>
+            <a:ext cx="6096000" cy="3429000"/>
           </a:xfrm>
           <a:custGeom>
             <a:avLst/>
@@ -1265,6 +1311,11 @@
         </p:txBody>
       </p:sp>
     </p:spTree>
+    <p:extLst>
+      <p:ext uri="{BB962C8B-B14F-4D97-AF65-F5344CB8AC3E}">
+        <p14:creationId xmlns:p14="http://schemas.microsoft.com/office/powerpoint/2010/main" val="853473048"/>
+      </p:ext>
+    </p:extLst>
   </p:cSld>
   <p:clrMapOvr>
     <a:masterClrMapping/>
@@ -1301,8 +1352,8 @@
         </p:nvSpPr>
         <p:spPr>
           <a:xfrm>
-            <a:off x="381187" y="685800"/>
-            <a:ext cx="6096299" cy="3429000"/>
+            <a:off x="381000" y="685800"/>
+            <a:ext cx="6096000" cy="3429000"/>
           </a:xfrm>
           <a:custGeom>
             <a:avLst/>
@@ -1376,6 +1427,11 @@
         </p:txBody>
       </p:sp>
     </p:spTree>
+    <p:extLst>
+      <p:ext uri="{BB962C8B-B14F-4D97-AF65-F5344CB8AC3E}">
+        <p14:creationId xmlns:p14="http://schemas.microsoft.com/office/powerpoint/2010/main" val="2652791187"/>
+      </p:ext>
+    </p:extLst>
   </p:cSld>
   <p:clrMapOvr>
     <a:masterClrMapping/>
@@ -2074,6 +2130,71 @@
           </a:lstStyle>
           <a:p>
             <a:endParaRPr/>
+          </a:p>
+        </p:txBody>
+      </p:sp>
+      <p:sp>
+        <p:nvSpPr>
+          <p:cNvPr id="2" name="Date Placeholder 1"/>
+          <p:cNvSpPr>
+            <a:spLocks noGrp="1"/>
+          </p:cNvSpPr>
+          <p:nvPr>
+            <p:ph type="dt" sz="half" idx="10"/>
+          </p:nvPr>
+        </p:nvSpPr>
+        <p:spPr/>
+        <p:txBody>
+          <a:bodyPr/>
+          <a:lstStyle/>
+          <a:p>
+            <a:r>
+              <a:rPr lang="en-US" smtClean="0"/>
+              <a:t>2014-11-07</a:t>
+            </a:r>
+            <a:endParaRPr lang="en-US"/>
+          </a:p>
+        </p:txBody>
+      </p:sp>
+      <p:sp>
+        <p:nvSpPr>
+          <p:cNvPr id="3" name="Footer Placeholder 2"/>
+          <p:cNvSpPr>
+            <a:spLocks noGrp="1"/>
+          </p:cNvSpPr>
+          <p:nvPr>
+            <p:ph type="ftr" sz="quarter" idx="11"/>
+          </p:nvPr>
+        </p:nvSpPr>
+        <p:spPr/>
+        <p:txBody>
+          <a:bodyPr/>
+          <a:lstStyle/>
+          <a:p>
+            <a:endParaRPr lang="en-US"/>
+          </a:p>
+        </p:txBody>
+      </p:sp>
+      <p:sp>
+        <p:nvSpPr>
+          <p:cNvPr id="4" name="Slide Number Placeholder 3"/>
+          <p:cNvSpPr>
+            <a:spLocks noGrp="1"/>
+          </p:cNvSpPr>
+          <p:nvPr>
+            <p:ph type="sldNum" sz="quarter" idx="12"/>
+          </p:nvPr>
+        </p:nvSpPr>
+        <p:spPr/>
+        <p:txBody>
+          <a:bodyPr/>
+          <a:lstStyle/>
+          <a:p>
+            <a:fld id="{E2A55E81-2818-4016-B972-9A1AED5F5395}" type="slidenum">
+              <a:rPr lang="en-US" smtClean="0"/>
+              <a:t>‹#›</a:t>
+            </a:fld>
+            <a:endParaRPr lang="en-US"/>
           </a:p>
         </p:txBody>
       </p:sp>
@@ -2200,7 +2321,7 @@
         <p:spPr>
           <a:xfrm>
             <a:off x="457200" y="1244242"/>
-            <a:ext cx="8229600" cy="3630300"/>
+            <a:ext cx="8229600" cy="3523020"/>
           </a:xfrm>
           <a:prstGeom prst="rect">
             <a:avLst/>
@@ -2265,7 +2386,7 @@
             </a:lvl9pPr>
           </a:lstStyle>
           <a:p>
-            <a:endParaRPr/>
+            <a:endParaRPr dirty="0"/>
           </a:p>
         </p:txBody>
       </p:sp>
@@ -2507,6 +2628,71 @@
           </a:p>
         </p:txBody>
       </p:sp>
+      <p:sp>
+        <p:nvSpPr>
+          <p:cNvPr id="2" name="Date Placeholder 1"/>
+          <p:cNvSpPr>
+            <a:spLocks noGrp="1"/>
+          </p:cNvSpPr>
+          <p:nvPr>
+            <p:ph type="dt" sz="half" idx="10"/>
+          </p:nvPr>
+        </p:nvSpPr>
+        <p:spPr/>
+        <p:txBody>
+          <a:bodyPr/>
+          <a:lstStyle/>
+          <a:p>
+            <a:r>
+              <a:rPr lang="en-US" smtClean="0"/>
+              <a:t>2014-11-07</a:t>
+            </a:r>
+            <a:endParaRPr lang="en-US"/>
+          </a:p>
+        </p:txBody>
+      </p:sp>
+      <p:sp>
+        <p:nvSpPr>
+          <p:cNvPr id="3" name="Footer Placeholder 2"/>
+          <p:cNvSpPr>
+            <a:spLocks noGrp="1"/>
+          </p:cNvSpPr>
+          <p:nvPr>
+            <p:ph type="ftr" sz="quarter" idx="11"/>
+          </p:nvPr>
+        </p:nvSpPr>
+        <p:spPr/>
+        <p:txBody>
+          <a:bodyPr/>
+          <a:lstStyle/>
+          <a:p>
+            <a:endParaRPr lang="en-US"/>
+          </a:p>
+        </p:txBody>
+      </p:sp>
+      <p:sp>
+        <p:nvSpPr>
+          <p:cNvPr id="4" name="Slide Number Placeholder 3"/>
+          <p:cNvSpPr>
+            <a:spLocks noGrp="1"/>
+          </p:cNvSpPr>
+          <p:nvPr>
+            <p:ph type="sldNum" sz="quarter" idx="12"/>
+          </p:nvPr>
+        </p:nvSpPr>
+        <p:spPr/>
+        <p:txBody>
+          <a:bodyPr/>
+          <a:lstStyle/>
+          <a:p>
+            <a:fld id="{E2A55E81-2818-4016-B972-9A1AED5F5395}" type="slidenum">
+              <a:rPr lang="en-US" smtClean="0"/>
+              <a:t>‹#›</a:t>
+            </a:fld>
+            <a:endParaRPr lang="en-US"/>
+          </a:p>
+        </p:txBody>
+      </p:sp>
     </p:spTree>
   </p:cSld>
   <p:clrMapOvr>
@@ -2868,7 +3054,7 @@
         <p:spPr>
           <a:xfrm>
             <a:off x="457200" y="1244242"/>
-            <a:ext cx="4038599" cy="3630300"/>
+            <a:ext cx="4038599" cy="3523020"/>
           </a:xfrm>
           <a:prstGeom prst="rect">
             <a:avLst/>
@@ -2950,7 +3136,7 @@
         <p:spPr>
           <a:xfrm>
             <a:off x="4648200" y="1244242"/>
-            <a:ext cx="4038599" cy="3630300"/>
+            <a:ext cx="4038599" cy="3523020"/>
           </a:xfrm>
           <a:prstGeom prst="rect">
             <a:avLst/>
@@ -3015,7 +3201,72 @@
             </a:lvl9pPr>
           </a:lstStyle>
           <a:p>
-            <a:endParaRPr/>
+            <a:endParaRPr dirty="0"/>
+          </a:p>
+        </p:txBody>
+      </p:sp>
+      <p:sp>
+        <p:nvSpPr>
+          <p:cNvPr id="2" name="Date Placeholder 1"/>
+          <p:cNvSpPr>
+            <a:spLocks noGrp="1"/>
+          </p:cNvSpPr>
+          <p:nvPr>
+            <p:ph type="dt" sz="half" idx="10"/>
+          </p:nvPr>
+        </p:nvSpPr>
+        <p:spPr/>
+        <p:txBody>
+          <a:bodyPr/>
+          <a:lstStyle/>
+          <a:p>
+            <a:r>
+              <a:rPr lang="en-US" smtClean="0"/>
+              <a:t>2014-11-07</a:t>
+            </a:r>
+            <a:endParaRPr lang="en-US"/>
+          </a:p>
+        </p:txBody>
+      </p:sp>
+      <p:sp>
+        <p:nvSpPr>
+          <p:cNvPr id="3" name="Footer Placeholder 2"/>
+          <p:cNvSpPr>
+            <a:spLocks noGrp="1"/>
+          </p:cNvSpPr>
+          <p:nvPr>
+            <p:ph type="ftr" sz="quarter" idx="11"/>
+          </p:nvPr>
+        </p:nvSpPr>
+        <p:spPr/>
+        <p:txBody>
+          <a:bodyPr/>
+          <a:lstStyle/>
+          <a:p>
+            <a:endParaRPr lang="en-US"/>
+          </a:p>
+        </p:txBody>
+      </p:sp>
+      <p:sp>
+        <p:nvSpPr>
+          <p:cNvPr id="4" name="Slide Number Placeholder 3"/>
+          <p:cNvSpPr>
+            <a:spLocks noGrp="1"/>
+          </p:cNvSpPr>
+          <p:nvPr>
+            <p:ph type="sldNum" sz="quarter" idx="12"/>
+          </p:nvPr>
+        </p:nvSpPr>
+        <p:spPr/>
+        <p:txBody>
+          <a:bodyPr/>
+          <a:lstStyle/>
+          <a:p>
+            <a:fld id="{E2A55E81-2818-4016-B972-9A1AED5F5395}" type="slidenum">
+              <a:rPr lang="en-US" smtClean="0"/>
+              <a:t>‹#›</a:t>
+            </a:fld>
+            <a:endParaRPr lang="en-US"/>
           </a:p>
         </p:txBody>
       </p:sp>
@@ -3364,6 +3615,71 @@
           </a:lstStyle>
           <a:p>
             <a:endParaRPr/>
+          </a:p>
+        </p:txBody>
+      </p:sp>
+      <p:sp>
+        <p:nvSpPr>
+          <p:cNvPr id="2" name="Date Placeholder 1"/>
+          <p:cNvSpPr>
+            <a:spLocks noGrp="1"/>
+          </p:cNvSpPr>
+          <p:nvPr>
+            <p:ph type="dt" sz="half" idx="10"/>
+          </p:nvPr>
+        </p:nvSpPr>
+        <p:spPr/>
+        <p:txBody>
+          <a:bodyPr/>
+          <a:lstStyle/>
+          <a:p>
+            <a:r>
+              <a:rPr lang="en-US" smtClean="0"/>
+              <a:t>2014-11-07</a:t>
+            </a:r>
+            <a:endParaRPr lang="en-US"/>
+          </a:p>
+        </p:txBody>
+      </p:sp>
+      <p:sp>
+        <p:nvSpPr>
+          <p:cNvPr id="3" name="Footer Placeholder 2"/>
+          <p:cNvSpPr>
+            <a:spLocks noGrp="1"/>
+          </p:cNvSpPr>
+          <p:nvPr>
+            <p:ph type="ftr" sz="quarter" idx="11"/>
+          </p:nvPr>
+        </p:nvSpPr>
+        <p:spPr/>
+        <p:txBody>
+          <a:bodyPr/>
+          <a:lstStyle/>
+          <a:p>
+            <a:endParaRPr lang="en-US"/>
+          </a:p>
+        </p:txBody>
+      </p:sp>
+      <p:sp>
+        <p:nvSpPr>
+          <p:cNvPr id="4" name="Slide Number Placeholder 3"/>
+          <p:cNvSpPr>
+            <a:spLocks noGrp="1"/>
+          </p:cNvSpPr>
+          <p:nvPr>
+            <p:ph type="sldNum" sz="quarter" idx="12"/>
+          </p:nvPr>
+        </p:nvSpPr>
+        <p:spPr/>
+        <p:txBody>
+          <a:bodyPr/>
+          <a:lstStyle/>
+          <a:p>
+            <a:fld id="{E2A55E81-2818-4016-B972-9A1AED5F5395}" type="slidenum">
+              <a:rPr lang="en-US" smtClean="0"/>
+              <a:t>‹#›</a:t>
+            </a:fld>
+            <a:endParaRPr lang="en-US"/>
           </a:p>
         </p:txBody>
       </p:sp>
@@ -3688,6 +4004,71 @@
           </a:p>
         </p:txBody>
       </p:sp>
+      <p:sp>
+        <p:nvSpPr>
+          <p:cNvPr id="2" name="Date Placeholder 1"/>
+          <p:cNvSpPr>
+            <a:spLocks noGrp="1"/>
+          </p:cNvSpPr>
+          <p:nvPr>
+            <p:ph type="dt" sz="half" idx="10"/>
+          </p:nvPr>
+        </p:nvSpPr>
+        <p:spPr/>
+        <p:txBody>
+          <a:bodyPr/>
+          <a:lstStyle/>
+          <a:p>
+            <a:r>
+              <a:rPr lang="en-US" smtClean="0"/>
+              <a:t>2014-11-07</a:t>
+            </a:r>
+            <a:endParaRPr lang="en-US"/>
+          </a:p>
+        </p:txBody>
+      </p:sp>
+      <p:sp>
+        <p:nvSpPr>
+          <p:cNvPr id="3" name="Footer Placeholder 2"/>
+          <p:cNvSpPr>
+            <a:spLocks noGrp="1"/>
+          </p:cNvSpPr>
+          <p:nvPr>
+            <p:ph type="ftr" sz="quarter" idx="11"/>
+          </p:nvPr>
+        </p:nvSpPr>
+        <p:spPr/>
+        <p:txBody>
+          <a:bodyPr/>
+          <a:lstStyle/>
+          <a:p>
+            <a:endParaRPr lang="en-US"/>
+          </a:p>
+        </p:txBody>
+      </p:sp>
+      <p:sp>
+        <p:nvSpPr>
+          <p:cNvPr id="4" name="Slide Number Placeholder 3"/>
+          <p:cNvSpPr>
+            <a:spLocks noGrp="1"/>
+          </p:cNvSpPr>
+          <p:nvPr>
+            <p:ph type="sldNum" sz="quarter" idx="12"/>
+          </p:nvPr>
+        </p:nvSpPr>
+        <p:spPr/>
+        <p:txBody>
+          <a:bodyPr/>
+          <a:lstStyle/>
+          <a:p>
+            <a:fld id="{E2A55E81-2818-4016-B972-9A1AED5F5395}" type="slidenum">
+              <a:rPr lang="en-US" smtClean="0"/>
+              <a:t>‹#›</a:t>
+            </a:fld>
+            <a:endParaRPr lang="en-US"/>
+          </a:p>
+        </p:txBody>
+      </p:sp>
     </p:spTree>
   </p:cSld>
   <p:clrMapOvr>
@@ -3713,6 +4094,71 @@
           <a:chExt cx="0" cy="0"/>
         </a:xfrm>
       </p:grpSpPr>
+      <p:sp>
+        <p:nvSpPr>
+          <p:cNvPr id="2" name="Date Placeholder 1"/>
+          <p:cNvSpPr>
+            <a:spLocks noGrp="1"/>
+          </p:cNvSpPr>
+          <p:nvPr>
+            <p:ph type="dt" sz="half" idx="10"/>
+          </p:nvPr>
+        </p:nvSpPr>
+        <p:spPr/>
+        <p:txBody>
+          <a:bodyPr/>
+          <a:lstStyle/>
+          <a:p>
+            <a:r>
+              <a:rPr lang="en-US" smtClean="0"/>
+              <a:t>2014-11-07</a:t>
+            </a:r>
+            <a:endParaRPr lang="en-US"/>
+          </a:p>
+        </p:txBody>
+      </p:sp>
+      <p:sp>
+        <p:nvSpPr>
+          <p:cNvPr id="3" name="Footer Placeholder 2"/>
+          <p:cNvSpPr>
+            <a:spLocks noGrp="1"/>
+          </p:cNvSpPr>
+          <p:nvPr>
+            <p:ph type="ftr" sz="quarter" idx="11"/>
+          </p:nvPr>
+        </p:nvSpPr>
+        <p:spPr/>
+        <p:txBody>
+          <a:bodyPr/>
+          <a:lstStyle/>
+          <a:p>
+            <a:endParaRPr lang="en-US"/>
+          </a:p>
+        </p:txBody>
+      </p:sp>
+      <p:sp>
+        <p:nvSpPr>
+          <p:cNvPr id="4" name="Slide Number Placeholder 3"/>
+          <p:cNvSpPr>
+            <a:spLocks noGrp="1"/>
+          </p:cNvSpPr>
+          <p:nvPr>
+            <p:ph type="sldNum" sz="quarter" idx="12"/>
+          </p:nvPr>
+        </p:nvSpPr>
+        <p:spPr/>
+        <p:txBody>
+          <a:bodyPr/>
+          <a:lstStyle/>
+          <a:p>
+            <a:fld id="{E2A55E81-2818-4016-B972-9A1AED5F5395}" type="slidenum">
+              <a:rPr lang="en-US" smtClean="0"/>
+              <a:t>‹#›</a:t>
+            </a:fld>
+            <a:endParaRPr lang="en-US"/>
+          </a:p>
+        </p:txBody>
+      </p:sp>
     </p:spTree>
   </p:cSld>
   <p:clrMapOvr>
@@ -4172,6 +4618,125 @@
           </a:p>
         </p:txBody>
       </p:sp>
+      <p:sp>
+        <p:nvSpPr>
+          <p:cNvPr id="2" name="Date Placeholder 1"/>
+          <p:cNvSpPr>
+            <a:spLocks noGrp="1"/>
+          </p:cNvSpPr>
+          <p:nvPr>
+            <p:ph type="dt" sz="half" idx="2"/>
+          </p:nvPr>
+        </p:nvSpPr>
+        <p:spPr>
+          <a:xfrm>
+            <a:off x="628650" y="4767263"/>
+            <a:ext cx="2057400" cy="274637"/>
+          </a:xfrm>
+          <a:prstGeom prst="rect">
+            <a:avLst/>
+          </a:prstGeom>
+        </p:spPr>
+        <p:txBody>
+          <a:bodyPr vert="horz" lIns="91440" tIns="45720" rIns="91440" bIns="45720" rtlCol="0" anchor="ctr"/>
+          <a:lstStyle>
+            <a:lvl1pPr algn="l">
+              <a:defRPr sz="1200">
+                <a:solidFill>
+                  <a:schemeClr val="tx1">
+                    <a:tint val="75000"/>
+                  </a:schemeClr>
+                </a:solidFill>
+              </a:defRPr>
+            </a:lvl1pPr>
+          </a:lstStyle>
+          <a:p>
+            <a:r>
+              <a:rPr lang="en-US" smtClean="0"/>
+              <a:t>2014-11-07</a:t>
+            </a:r>
+            <a:endParaRPr lang="en-US"/>
+          </a:p>
+        </p:txBody>
+      </p:sp>
+      <p:sp>
+        <p:nvSpPr>
+          <p:cNvPr id="3" name="Footer Placeholder 2"/>
+          <p:cNvSpPr>
+            <a:spLocks noGrp="1"/>
+          </p:cNvSpPr>
+          <p:nvPr>
+            <p:ph type="ftr" sz="quarter" idx="3"/>
+          </p:nvPr>
+        </p:nvSpPr>
+        <p:spPr>
+          <a:xfrm>
+            <a:off x="3028950" y="4767263"/>
+            <a:ext cx="3086100" cy="274637"/>
+          </a:xfrm>
+          <a:prstGeom prst="rect">
+            <a:avLst/>
+          </a:prstGeom>
+        </p:spPr>
+        <p:txBody>
+          <a:bodyPr vert="horz" lIns="91440" tIns="45720" rIns="91440" bIns="45720" rtlCol="0" anchor="ctr"/>
+          <a:lstStyle>
+            <a:lvl1pPr algn="ctr">
+              <a:defRPr sz="1200">
+                <a:solidFill>
+                  <a:schemeClr val="tx1">
+                    <a:tint val="75000"/>
+                  </a:schemeClr>
+                </a:solidFill>
+              </a:defRPr>
+            </a:lvl1pPr>
+          </a:lstStyle>
+          <a:p>
+            <a:endParaRPr lang="en-US"/>
+          </a:p>
+        </p:txBody>
+      </p:sp>
+      <p:sp>
+        <p:nvSpPr>
+          <p:cNvPr id="4" name="Slide Number Placeholder 3"/>
+          <p:cNvSpPr>
+            <a:spLocks noGrp="1"/>
+          </p:cNvSpPr>
+          <p:nvPr>
+            <p:ph type="sldNum" sz="quarter" idx="4"/>
+          </p:nvPr>
+        </p:nvSpPr>
+        <p:spPr>
+          <a:xfrm>
+            <a:off x="6457950" y="4767263"/>
+            <a:ext cx="2057400" cy="274637"/>
+          </a:xfrm>
+          <a:prstGeom prst="rect">
+            <a:avLst/>
+          </a:prstGeom>
+        </p:spPr>
+        <p:txBody>
+          <a:bodyPr vert="horz" lIns="91440" tIns="45720" rIns="91440" bIns="45720" rtlCol="0" anchor="ctr"/>
+          <a:lstStyle>
+            <a:lvl1pPr algn="r">
+              <a:defRPr sz="1200">
+                <a:solidFill>
+                  <a:schemeClr val="tx1">
+                    <a:tint val="75000"/>
+                  </a:schemeClr>
+                </a:solidFill>
+              </a:defRPr>
+            </a:lvl1pPr>
+          </a:lstStyle>
+          <a:p>
+            <a:fld id="{E2A55E81-2818-4016-B972-9A1AED5F5395}" type="slidenum">
+              <a:rPr lang="en-US" smtClean="0"/>
+              <a:t>‹#›</a:t>
+            </a:fld>
+            <a:endParaRPr lang="en-US"/>
+          </a:p>
+        </p:txBody>
+      </p:sp>
     </p:spTree>
   </p:cSld>
   <p:clrMap bg1="lt1" tx1="dk1" bg2="dk2" tx2="lt2" accent1="accent1" accent2="accent2" accent3="accent3" accent4="accent4" accent5="accent5" accent6="accent6" hlink="hlink" folHlink="folHlink"/>
@@ -4183,7 +4748,7 @@
     <p:sldLayoutId id="2147483652" r:id="rId5"/>
     <p:sldLayoutId id="2147483653" r:id="rId6"/>
   </p:sldLayoutIdLst>
-  <p:hf sldNum="0" hdr="0" ftr="0" dt="0"/>
+  <p:hf hdr="0" ftr="0"/>
   <p:txStyles>
     <p:titleStyle>
       <a:defPPr marR="0" algn="l" rtl="0">
@@ -4696,10 +5261,6 @@
           </p:nvPr>
         </p:nvSpPr>
         <p:spPr>
-          <a:xfrm>
-            <a:off x="1082040" y="1165860"/>
-            <a:ext cx="7050900" cy="1102500"/>
-          </a:xfrm>
           <a:prstGeom prst="rect">
             <a:avLst/>
           </a:prstGeom>
@@ -4716,7 +5277,7 @@
               </a:spcBef>
               <a:buNone/>
             </a:pPr>
-            <a:endParaRPr/>
+            <a:endParaRPr dirty="0"/>
           </a:p>
           <a:p>
             <a:pPr algn="ctr" rtl="0">
@@ -4725,7 +5286,7 @@
               </a:spcBef>
               <a:buNone/>
             </a:pPr>
-            <a:endParaRPr sz="2400"/>
+            <a:endParaRPr sz="2400" dirty="0"/>
           </a:p>
           <a:p>
             <a:pPr algn="ctr">
@@ -4735,7 +5296,7 @@
               <a:buNone/>
             </a:pPr>
             <a:r>
-              <a:rPr lang="en" sz="2400"/>
+              <a:rPr lang="en" sz="2400" dirty="0"/>
               <a:t>WCP52  USB Gain/Phase Analyzer</a:t>
             </a:r>
           </a:p>
@@ -4752,10 +5313,6 @@
           </p:nvPr>
         </p:nvSpPr>
         <p:spPr>
-          <a:xfrm>
-            <a:off x="1082040" y="2423159"/>
-            <a:ext cx="7035899" cy="694199"/>
-          </a:xfrm>
           <a:prstGeom prst="rect">
             <a:avLst/>
           </a:prstGeom>
@@ -4773,75 +5330,60 @@
               <a:buNone/>
             </a:pPr>
             <a:r>
-              <a:rPr lang="en" sz="1800"/>
-              <a:t>Low-cost, open-source gain/phase analyzer</a:t>
+              <a:rPr lang="en" sz="1800" dirty="0"/>
+              <a:t>Low-cost, open-source gain/phase </a:t>
             </a:r>
-          </a:p>
-          <a:p>
-            <a:pPr rtl="0">
-              <a:spcBef>
-                <a:spcPts val="0"/>
-              </a:spcBef>
-              <a:buNone/>
-            </a:pPr>
-            <a:endParaRPr/>
-          </a:p>
-          <a:p>
-            <a:pPr rtl="0">
-              <a:spcBef>
-                <a:spcPts val="0"/>
-              </a:spcBef>
-              <a:buNone/>
-            </a:pPr>
-            <a:endParaRPr/>
-          </a:p>
-          <a:p>
-            <a:pPr rtl="0">
-              <a:spcBef>
-                <a:spcPts val="0"/>
-              </a:spcBef>
-              <a:buNone/>
-            </a:pPr>
-            <a:endParaRPr/>
-          </a:p>
-          <a:p>
-            <a:pPr rtl="0">
-              <a:spcBef>
-                <a:spcPts val="0"/>
-              </a:spcBef>
-              <a:buNone/>
-            </a:pPr>
-            <a:endParaRPr/>
-          </a:p>
-          <a:p>
-            <a:pPr algn="l" rtl="0">
-              <a:spcBef>
-                <a:spcPts val="0"/>
-              </a:spcBef>
-              <a:buNone/>
-            </a:pPr>
-            <a:endParaRPr sz="1100"/>
-          </a:p>
-          <a:p>
-            <a:pPr algn="l" rtl="0">
-              <a:spcBef>
-                <a:spcPts val="0"/>
-              </a:spcBef>
-              <a:buNone/>
-            </a:pPr>
-            <a:endParaRPr sz="1100"/>
-          </a:p>
-          <a:p>
-            <a:pPr algn="l">
-              <a:spcBef>
-                <a:spcPts val="0"/>
-              </a:spcBef>
-              <a:buNone/>
-            </a:pPr>
             <a:r>
-              <a:rPr lang="en" sz="1100"/>
-              <a:t>2014-10-31                                                              0</a:t>
+              <a:rPr lang="en" sz="1800" dirty="0" smtClean="0"/>
+              <a:t>analyzer</a:t>
             </a:r>
+            <a:endParaRPr lang="en" sz="1800" dirty="0"/>
+          </a:p>
+        </p:txBody>
+      </p:sp>
+      <p:sp>
+        <p:nvSpPr>
+          <p:cNvPr id="2" name="Date Placeholder 1"/>
+          <p:cNvSpPr>
+            <a:spLocks noGrp="1"/>
+          </p:cNvSpPr>
+          <p:nvPr>
+            <p:ph type="dt" sz="half" idx="10"/>
+          </p:nvPr>
+        </p:nvSpPr>
+        <p:spPr/>
+        <p:txBody>
+          <a:bodyPr/>
+          <a:lstStyle/>
+          <a:p>
+            <a:r>
+              <a:rPr lang="en-US" smtClean="0"/>
+              <a:t>2014-11-07</a:t>
+            </a:r>
+            <a:endParaRPr lang="en-US"/>
+          </a:p>
+        </p:txBody>
+      </p:sp>
+      <p:sp>
+        <p:nvSpPr>
+          <p:cNvPr id="3" name="Slide Number Placeholder 2"/>
+          <p:cNvSpPr>
+            <a:spLocks noGrp="1"/>
+          </p:cNvSpPr>
+          <p:nvPr>
+            <p:ph type="sldNum" sz="quarter" idx="12"/>
+          </p:nvPr>
+        </p:nvSpPr>
+        <p:spPr/>
+        <p:txBody>
+          <a:bodyPr/>
+          <a:lstStyle/>
+          <a:p>
+            <a:fld id="{E2A55E81-2818-4016-B972-9A1AED5F5395}" type="slidenum">
+              <a:rPr lang="en-US" smtClean="0"/>
+              <a:t>1</a:t>
+            </a:fld>
+            <a:endParaRPr lang="en-US"/>
           </a:p>
         </p:txBody>
       </p:sp>
@@ -4884,10 +5426,6 @@
           </p:nvPr>
         </p:nvSpPr>
         <p:spPr>
-          <a:xfrm>
-            <a:off x="457200" y="1244250"/>
-            <a:ext cx="8229600" cy="3690300"/>
-          </a:xfrm>
           <a:prstGeom prst="rect">
             <a:avLst/>
           </a:prstGeom>
@@ -4919,7 +5457,7 @@
               <a:buChar char="●"/>
             </a:pPr>
             <a:r>
-              <a:rPr lang="en" sz="1800"/>
+              <a:rPr lang="en" sz="1800" dirty="0"/>
               <a:t>Chris Pavlina- EE Student Team Lead</a:t>
             </a:r>
           </a:p>
@@ -4936,7 +5474,7 @@
               <a:buChar char="●"/>
             </a:pPr>
             <a:r>
-              <a:rPr lang="en" sz="1800"/>
+              <a:rPr lang="en" sz="1800" dirty="0"/>
               <a:t>Kaidi Xu- EE Student</a:t>
             </a:r>
           </a:p>
@@ -4953,7 +5491,7 @@
               <a:buChar char="●"/>
             </a:pPr>
             <a:r>
-              <a:rPr lang="en" sz="1800"/>
+              <a:rPr lang="en" sz="1800" dirty="0"/>
               <a:t>Kenneth Zachary- CoE Student</a:t>
             </a:r>
           </a:p>
@@ -4970,7 +5508,7 @@
               <a:buChar char="●"/>
             </a:pPr>
             <a:r>
-              <a:rPr lang="en" sz="1800"/>
+              <a:rPr lang="en" sz="1800" dirty="0"/>
               <a:t>Harrison Owens- CoE Student</a:t>
             </a:r>
           </a:p>
@@ -4987,7 +5525,7 @@
               <a:buChar char="●"/>
             </a:pPr>
             <a:r>
-              <a:rPr lang="en" sz="1800"/>
+              <a:rPr lang="en" sz="1800" dirty="0"/>
               <a:t>Prof. Kyle Temkin- Faculty Advisor</a:t>
             </a:r>
           </a:p>
@@ -5004,27 +5542,27 @@
               <a:buChar char="●"/>
             </a:pPr>
             <a:r>
-              <a:rPr lang="en" sz="1800"/>
+              <a:rPr lang="en" sz="1800" dirty="0"/>
               <a:t>Prof. Maynard - Program Manager</a:t>
             </a:r>
           </a:p>
           <a:p>
-            <a:pPr rtl="0">
+            <a:pPr algn="r" rtl="0">
               <a:spcBef>
                 <a:spcPts val="0"/>
               </a:spcBef>
               <a:buNone/>
             </a:pPr>
-            <a:endParaRPr sz="1800"/>
-          </a:p>
-          <a:p>
-            <a:pPr rtl="0">
+            <a:endParaRPr sz="600" dirty="0"/>
+          </a:p>
+          <a:p>
+            <a:pPr algn="r" rtl="0">
               <a:spcBef>
                 <a:spcPts val="0"/>
               </a:spcBef>
               <a:buNone/>
             </a:pPr>
-            <a:endParaRPr sz="1800"/>
+            <a:endParaRPr sz="600" dirty="0"/>
           </a:p>
           <a:p>
             <a:pPr algn="r" rtl="0">
@@ -5033,124 +5571,7 @@
               </a:spcBef>
               <a:buNone/>
             </a:pPr>
-            <a:r>
-              <a:rPr lang="en" sz="1800"/>
-              <a:t>				</a:t>
-            </a:r>
-            <a:r>
-              <a:rPr lang="en" sz="800"/>
-              <a:t>							</a:t>
-            </a:r>
-            <a:r>
-              <a:rPr lang="en" sz="600"/>
-              <a:t>[Pictured Left to Right: Harrison Owens,Kenneth Zachary,Chris Pavlina, Kaidi Xu]</a:t>
-            </a:r>
-          </a:p>
-          <a:p>
-            <a:pPr algn="r" rtl="0">
-              <a:spcBef>
-                <a:spcPts val="0"/>
-              </a:spcBef>
-              <a:buNone/>
-            </a:pPr>
-            <a:endParaRPr sz="600"/>
-          </a:p>
-          <a:p>
-            <a:pPr algn="r" rtl="0">
-              <a:spcBef>
-                <a:spcPts val="0"/>
-              </a:spcBef>
-              <a:buNone/>
-            </a:pPr>
-            <a:endParaRPr sz="600"/>
-          </a:p>
-          <a:p>
-            <a:pPr algn="r" rtl="0">
-              <a:spcBef>
-                <a:spcPts val="0"/>
-              </a:spcBef>
-              <a:buNone/>
-            </a:pPr>
-            <a:endParaRPr sz="600"/>
-          </a:p>
-          <a:p>
-            <a:pPr algn="r" rtl="0">
-              <a:spcBef>
-                <a:spcPts val="0"/>
-              </a:spcBef>
-              <a:buNone/>
-            </a:pPr>
-            <a:endParaRPr sz="600"/>
-          </a:p>
-          <a:p>
-            <a:pPr algn="r" rtl="0">
-              <a:spcBef>
-                <a:spcPts val="0"/>
-              </a:spcBef>
-              <a:buNone/>
-            </a:pPr>
-            <a:endParaRPr sz="600"/>
-          </a:p>
-          <a:p>
-            <a:pPr algn="r" rtl="0">
-              <a:spcBef>
-                <a:spcPts val="0"/>
-              </a:spcBef>
-              <a:buNone/>
-            </a:pPr>
-            <a:endParaRPr sz="600"/>
-          </a:p>
-          <a:p>
-            <a:pPr algn="r" rtl="0">
-              <a:spcBef>
-                <a:spcPts val="0"/>
-              </a:spcBef>
-              <a:buNone/>
-            </a:pPr>
-            <a:endParaRPr sz="600"/>
-          </a:p>
-          <a:p>
-            <a:pPr algn="r" rtl="0">
-              <a:spcBef>
-                <a:spcPts val="0"/>
-              </a:spcBef>
-              <a:buNone/>
-            </a:pPr>
-            <a:endParaRPr sz="600"/>
-          </a:p>
-          <a:p>
-            <a:pPr algn="r" rtl="0">
-              <a:spcBef>
-                <a:spcPts val="0"/>
-              </a:spcBef>
-              <a:buNone/>
-            </a:pPr>
-            <a:endParaRPr sz="600"/>
-          </a:p>
-          <a:p>
-            <a:pPr algn="r" rtl="0">
-              <a:spcBef>
-                <a:spcPts val="0"/>
-              </a:spcBef>
-              <a:buNone/>
-            </a:pPr>
-            <a:endParaRPr sz="600"/>
-          </a:p>
-          <a:p>
-            <a:pPr lvl="0">
-              <a:spcBef>
-                <a:spcPts val="0"/>
-              </a:spcBef>
-              <a:buNone/>
-            </a:pPr>
-            <a:r>
-              <a:rPr lang="en" sz="1100">
-                <a:solidFill>
-                  <a:srgbClr val="FFFFFF"/>
-                </a:solidFill>
-              </a:rPr>
-              <a:t>2014-10-31                                                                            1</a:t>
-            </a:r>
+            <a:endParaRPr sz="600" dirty="0"/>
           </a:p>
         </p:txBody>
       </p:sp>
@@ -5165,10 +5586,6 @@
           </p:nvPr>
         </p:nvSpPr>
         <p:spPr>
-          <a:xfrm>
-            <a:off x="457200" y="205978"/>
-            <a:ext cx="8229600" cy="994200"/>
-          </a:xfrm>
           <a:prstGeom prst="rect">
             <a:avLst/>
           </a:prstGeom>
@@ -5236,6 +5653,98 @@
           </a:ln>
         </p:spPr>
       </p:pic>
+      <p:sp>
+        <p:nvSpPr>
+          <p:cNvPr id="2" name="TextBox 1"/>
+          <p:cNvSpPr txBox="1"/>
+          <p:nvPr/>
+        </p:nvSpPr>
+        <p:spPr>
+          <a:xfrm>
+            <a:off x="5715000" y="3387338"/>
+            <a:ext cx="2818400" cy="553998"/>
+          </a:xfrm>
+          <a:prstGeom prst="rect">
+            <a:avLst/>
+          </a:prstGeom>
+          <a:noFill/>
+        </p:spPr>
+        <p:txBody>
+          <a:bodyPr wrap="none" rtlCol="0">
+            <a:spAutoFit/>
+          </a:bodyPr>
+          <a:lstStyle/>
+          <a:p>
+            <a:r>
+              <a:rPr lang="en" sz="800" dirty="0"/>
+              <a:t>[Pictured Left to Right: Harrison Owens,Kenneth Zachary</a:t>
+            </a:r>
+            <a:r>
+              <a:rPr lang="en" sz="800" dirty="0" smtClean="0"/>
+              <a:t>,</a:t>
+            </a:r>
+          </a:p>
+          <a:p>
+            <a:r>
+              <a:rPr lang="en" sz="800" dirty="0" smtClean="0"/>
+              <a:t>Chris </a:t>
+            </a:r>
+            <a:r>
+              <a:rPr lang="en" sz="800" dirty="0"/>
+              <a:t>Pavlina, Kaidi Xu]</a:t>
+            </a:r>
+          </a:p>
+          <a:p>
+            <a:endParaRPr lang="en-US" dirty="0"/>
+          </a:p>
+        </p:txBody>
+      </p:sp>
+      <p:sp>
+        <p:nvSpPr>
+          <p:cNvPr id="3" name="Date Placeholder 2"/>
+          <p:cNvSpPr>
+            <a:spLocks noGrp="1"/>
+          </p:cNvSpPr>
+          <p:nvPr>
+            <p:ph type="dt" sz="half" idx="10"/>
+          </p:nvPr>
+        </p:nvSpPr>
+        <p:spPr/>
+        <p:txBody>
+          <a:bodyPr/>
+          <a:lstStyle/>
+          <a:p>
+            <a:r>
+              <a:rPr lang="en-US" smtClean="0"/>
+              <a:t>2014-11-07</a:t>
+            </a:r>
+            <a:endParaRPr lang="en-US"/>
+          </a:p>
+        </p:txBody>
+      </p:sp>
+      <p:sp>
+        <p:nvSpPr>
+          <p:cNvPr id="4" name="Slide Number Placeholder 3"/>
+          <p:cNvSpPr>
+            <a:spLocks noGrp="1"/>
+          </p:cNvSpPr>
+          <p:nvPr>
+            <p:ph type="sldNum" sz="quarter" idx="12"/>
+          </p:nvPr>
+        </p:nvSpPr>
+        <p:spPr/>
+        <p:txBody>
+          <a:bodyPr/>
+          <a:lstStyle/>
+          <a:p>
+            <a:fld id="{E2A55E81-2818-4016-B972-9A1AED5F5395}" type="slidenum">
+              <a:rPr lang="en-US" smtClean="0"/>
+              <a:t>2</a:t>
+            </a:fld>
+            <a:endParaRPr lang="en-US"/>
+          </a:p>
+        </p:txBody>
+      </p:sp>
     </p:spTree>
   </p:cSld>
   <p:clrMapOvr>
@@ -5275,10 +5784,6 @@
           </p:nvPr>
         </p:nvSpPr>
         <p:spPr>
-          <a:xfrm>
-            <a:off x="457200" y="1244242"/>
-            <a:ext cx="8229600" cy="3630300"/>
-          </a:xfrm>
           <a:prstGeom prst="rect">
             <a:avLst/>
           </a:prstGeom>
@@ -5298,7 +5803,7 @@
               </a:spcBef>
               <a:buNone/>
             </a:pPr>
-            <a:endParaRPr/>
+            <a:endParaRPr dirty="0"/>
           </a:p>
           <a:p>
             <a:pPr rtl="0">
@@ -5308,9 +5813,14 @@
               <a:buNone/>
             </a:pPr>
             <a:r>
-              <a:rPr lang="en" sz="2400"/>
-              <a:t>We are creating a USB driven device that analyzes the frequency response of filters, amplifiers, and control systems and creates a corresponding Bode Plot of the analysis.</a:t>
+              <a:rPr lang="en" sz="2400" dirty="0"/>
+              <a:t>We are creating a USB driven device that analyzes the frequency response of filters, amplifiers, and control systems and creates a corresponding Bode Plot of the analysis</a:t>
             </a:r>
+            <a:r>
+              <a:rPr lang="en" sz="2400" dirty="0" smtClean="0"/>
+              <a:t>.</a:t>
+            </a:r>
+            <a:endParaRPr dirty="0"/>
           </a:p>
           <a:p>
             <a:pPr rtl="0">
@@ -5319,91 +5829,16 @@
               </a:spcBef>
               <a:buNone/>
             </a:pPr>
-            <a:endParaRPr sz="2400"/>
-          </a:p>
-          <a:p>
-            <a:pPr rtl="0">
+            <a:endParaRPr dirty="0"/>
+          </a:p>
+          <a:p>
+            <a:pPr>
               <a:spcBef>
                 <a:spcPts val="0"/>
               </a:spcBef>
               <a:buNone/>
             </a:pPr>
-            <a:endParaRPr sz="2400"/>
-          </a:p>
-          <a:p>
-            <a:pPr rtl="0">
-              <a:spcBef>
-                <a:spcPts val="0"/>
-              </a:spcBef>
-              <a:buNone/>
-            </a:pPr>
-            <a:endParaRPr sz="2400"/>
-          </a:p>
-          <a:p>
-            <a:pPr rtl="0">
-              <a:spcBef>
-                <a:spcPts val="0"/>
-              </a:spcBef>
-              <a:buNone/>
-            </a:pPr>
-            <a:endParaRPr sz="1100"/>
-          </a:p>
-          <a:p>
-            <a:pPr rtl="0">
-              <a:spcBef>
-                <a:spcPts val="0"/>
-              </a:spcBef>
-              <a:buNone/>
-            </a:pPr>
-            <a:endParaRPr sz="1100"/>
-          </a:p>
-          <a:p>
-            <a:pPr rtl="0">
-              <a:spcBef>
-                <a:spcPts val="0"/>
-              </a:spcBef>
-              <a:buNone/>
-            </a:pPr>
-            <a:endParaRPr sz="1100"/>
-          </a:p>
-          <a:p>
-            <a:pPr rtl="0">
-              <a:spcBef>
-                <a:spcPts val="0"/>
-              </a:spcBef>
-              <a:buNone/>
-            </a:pPr>
-            <a:r>
-              <a:rPr lang="en" sz="1100"/>
-              <a:t>2014-10-31                                                                         2</a:t>
-            </a:r>
-          </a:p>
-          <a:p>
-            <a:pPr rtl="0">
-              <a:spcBef>
-                <a:spcPts val="0"/>
-              </a:spcBef>
-              <a:buNone/>
-            </a:pPr>
-            <a:endParaRPr/>
-          </a:p>
-          <a:p>
-            <a:pPr rtl="0">
-              <a:spcBef>
-                <a:spcPts val="0"/>
-              </a:spcBef>
-              <a:buNone/>
-            </a:pPr>
-            <a:endParaRPr/>
-          </a:p>
-          <a:p>
-            <a:pPr>
-              <a:spcBef>
-                <a:spcPts val="0"/>
-              </a:spcBef>
-              <a:buNone/>
-            </a:pPr>
-            <a:endParaRPr/>
+            <a:endParaRPr dirty="0"/>
           </a:p>
         </p:txBody>
       </p:sp>
@@ -5418,10 +5853,6 @@
           </p:nvPr>
         </p:nvSpPr>
         <p:spPr>
-          <a:xfrm>
-            <a:off x="457200" y="205978"/>
-            <a:ext cx="8229600" cy="994200"/>
-          </a:xfrm>
           <a:prstGeom prst="rect">
             <a:avLst/>
           </a:prstGeom>
@@ -5454,6 +5885,52 @@
               <a:rPr lang="en" sz="2400"/>
               <a:t>Executive Summary </a:t>
             </a:r>
+          </a:p>
+        </p:txBody>
+      </p:sp>
+      <p:sp>
+        <p:nvSpPr>
+          <p:cNvPr id="2" name="Date Placeholder 1"/>
+          <p:cNvSpPr>
+            <a:spLocks noGrp="1"/>
+          </p:cNvSpPr>
+          <p:nvPr>
+            <p:ph type="dt" sz="half" idx="10"/>
+          </p:nvPr>
+        </p:nvSpPr>
+        <p:spPr/>
+        <p:txBody>
+          <a:bodyPr/>
+          <a:lstStyle/>
+          <a:p>
+            <a:r>
+              <a:rPr lang="en-US" smtClean="0"/>
+              <a:t>2014-11-07</a:t>
+            </a:r>
+            <a:endParaRPr lang="en-US"/>
+          </a:p>
+        </p:txBody>
+      </p:sp>
+      <p:sp>
+        <p:nvSpPr>
+          <p:cNvPr id="3" name="Slide Number Placeholder 2"/>
+          <p:cNvSpPr>
+            <a:spLocks noGrp="1"/>
+          </p:cNvSpPr>
+          <p:nvPr>
+            <p:ph type="sldNum" sz="quarter" idx="12"/>
+          </p:nvPr>
+        </p:nvSpPr>
+        <p:spPr/>
+        <p:txBody>
+          <a:bodyPr/>
+          <a:lstStyle/>
+          <a:p>
+            <a:fld id="{E2A55E81-2818-4016-B972-9A1AED5F5395}" type="slidenum">
+              <a:rPr lang="en-US" smtClean="0"/>
+              <a:t>3</a:t>
+            </a:fld>
+            <a:endParaRPr lang="en-US"/>
           </a:p>
         </p:txBody>
       </p:sp>
@@ -5516,7 +5993,7 @@
               </a:spcBef>
               <a:buNone/>
             </a:pPr>
-            <a:endParaRPr/>
+            <a:endParaRPr dirty="0"/>
           </a:p>
           <a:p>
             <a:pPr rtl="0">
@@ -5525,7 +6002,7 @@
               </a:spcBef>
               <a:buNone/>
             </a:pPr>
-            <a:endParaRPr/>
+            <a:endParaRPr dirty="0"/>
           </a:p>
           <a:p>
             <a:pPr rtl="0">
@@ -5534,7 +6011,7 @@
               </a:spcBef>
               <a:buNone/>
             </a:pPr>
-            <a:endParaRPr/>
+            <a:endParaRPr dirty="0"/>
           </a:p>
           <a:p>
             <a:pPr rtl="0">
@@ -5543,7 +6020,7 @@
               </a:spcBef>
               <a:buNone/>
             </a:pPr>
-            <a:endParaRPr/>
+            <a:endParaRPr dirty="0"/>
           </a:p>
           <a:p>
             <a:pPr rtl="0">
@@ -5552,7 +6029,7 @@
               </a:spcBef>
               <a:buNone/>
             </a:pPr>
-            <a:endParaRPr/>
+            <a:endParaRPr dirty="0"/>
           </a:p>
           <a:p>
             <a:pPr rtl="0">
@@ -5561,7 +6038,7 @@
               </a:spcBef>
               <a:buNone/>
             </a:pPr>
-            <a:endParaRPr/>
+            <a:endParaRPr dirty="0"/>
           </a:p>
           <a:p>
             <a:pPr rtl="0">
@@ -5570,7 +6047,7 @@
               </a:spcBef>
               <a:buNone/>
             </a:pPr>
-            <a:endParaRPr sz="1100">
+            <a:endParaRPr sz="1100" dirty="0">
               <a:solidFill>
                 <a:srgbClr val="FFFFFF"/>
               </a:solidFill>
@@ -5583,7 +6060,7 @@
               </a:spcBef>
               <a:buNone/>
             </a:pPr>
-            <a:endParaRPr sz="1100">
+            <a:endParaRPr sz="1100" dirty="0">
               <a:solidFill>
                 <a:srgbClr val="FFFFFF"/>
               </a:solidFill>
@@ -5597,7 +6074,7 @@
               <a:buNone/>
             </a:pPr>
             <a:r>
-              <a:rPr lang="en" sz="1100">
+              <a:rPr lang="en" sz="1100" dirty="0">
                 <a:solidFill>
                   <a:srgbClr val="FFFFFF"/>
                 </a:solidFill>
@@ -5612,7 +6089,7 @@
               </a:spcBef>
               <a:buNone/>
             </a:pPr>
-            <a:endParaRPr/>
+            <a:endParaRPr dirty="0"/>
           </a:p>
           <a:p>
             <a:pPr rtl="0">
@@ -5621,7 +6098,7 @@
               </a:spcBef>
               <a:buNone/>
             </a:pPr>
-            <a:endParaRPr/>
+            <a:endParaRPr dirty="0"/>
           </a:p>
           <a:p>
             <a:pPr rtl="0">
@@ -5630,7 +6107,7 @@
               </a:spcBef>
               <a:buNone/>
             </a:pPr>
-            <a:endParaRPr/>
+            <a:endParaRPr dirty="0"/>
           </a:p>
           <a:p>
             <a:pPr rtl="0">
@@ -5639,7 +6116,7 @@
               </a:spcBef>
               <a:buNone/>
             </a:pPr>
-            <a:endParaRPr/>
+            <a:endParaRPr dirty="0"/>
           </a:p>
           <a:p>
             <a:pPr rtl="0">
@@ -5648,7 +6125,7 @@
               </a:spcBef>
               <a:buNone/>
             </a:pPr>
-            <a:endParaRPr/>
+            <a:endParaRPr dirty="0"/>
           </a:p>
           <a:p>
             <a:pPr>
@@ -5657,7 +6134,7 @@
               </a:spcBef>
               <a:buNone/>
             </a:pPr>
-            <a:endParaRPr sz="1100">
+            <a:endParaRPr sz="1100" dirty="0">
               <a:solidFill>
                 <a:srgbClr val="FFFFFF"/>
               </a:solidFill>
@@ -5743,6 +6220,52 @@
           </a:ln>
         </p:spPr>
       </p:pic>
+      <p:sp>
+        <p:nvSpPr>
+          <p:cNvPr id="2" name="Date Placeholder 1"/>
+          <p:cNvSpPr>
+            <a:spLocks noGrp="1"/>
+          </p:cNvSpPr>
+          <p:nvPr>
+            <p:ph type="dt" sz="half" idx="10"/>
+          </p:nvPr>
+        </p:nvSpPr>
+        <p:spPr/>
+        <p:txBody>
+          <a:bodyPr/>
+          <a:lstStyle/>
+          <a:p>
+            <a:r>
+              <a:rPr lang="en-US" smtClean="0"/>
+              <a:t>2014-11-07</a:t>
+            </a:r>
+            <a:endParaRPr lang="en-US"/>
+          </a:p>
+        </p:txBody>
+      </p:sp>
+      <p:sp>
+        <p:nvSpPr>
+          <p:cNvPr id="3" name="Slide Number Placeholder 2"/>
+          <p:cNvSpPr>
+            <a:spLocks noGrp="1"/>
+          </p:cNvSpPr>
+          <p:nvPr>
+            <p:ph type="sldNum" sz="quarter" idx="12"/>
+          </p:nvPr>
+        </p:nvSpPr>
+        <p:spPr/>
+        <p:txBody>
+          <a:bodyPr/>
+          <a:lstStyle/>
+          <a:p>
+            <a:fld id="{E2A55E81-2818-4016-B972-9A1AED5F5395}" type="slidenum">
+              <a:rPr lang="en-US" smtClean="0"/>
+              <a:t>4</a:t>
+            </a:fld>
+            <a:endParaRPr lang="en-US"/>
+          </a:p>
+        </p:txBody>
+      </p:sp>
     </p:spTree>
   </p:cSld>
   <p:clrMapOvr>
@@ -5773,186 +6296,6 @@
       </p:grpSpPr>
       <p:sp>
         <p:nvSpPr>
-          <p:cNvPr id="67" name="Shape 67"/>
-          <p:cNvSpPr txBox="1">
-            <a:spLocks noGrp="1"/>
-          </p:cNvSpPr>
-          <p:nvPr>
-            <p:ph type="body" idx="1"/>
-          </p:nvPr>
-        </p:nvSpPr>
-        <p:spPr>
-          <a:xfrm>
-            <a:off x="457200" y="1244242"/>
-            <a:ext cx="8229600" cy="3630300"/>
-          </a:xfrm>
-          <a:prstGeom prst="rect">
-            <a:avLst/>
-          </a:prstGeom>
-        </p:spPr>
-        <p:txBody>
-          <a:bodyPr lIns="91425" tIns="91425" rIns="91425" bIns="91425" anchor="t" anchorCtr="0">
-            <a:noAutofit/>
-          </a:bodyPr>
-          <a:lstStyle/>
-          <a:p>
-            <a:pPr lvl="0" rtl="0">
-              <a:spcBef>
-                <a:spcPts val="0"/>
-              </a:spcBef>
-              <a:buNone/>
-            </a:pPr>
-            <a:endParaRPr/>
-          </a:p>
-          <a:p>
-            <a:pPr lvl="0" rtl="0">
-              <a:spcBef>
-                <a:spcPts val="0"/>
-              </a:spcBef>
-              <a:buNone/>
-            </a:pPr>
-            <a:endParaRPr/>
-          </a:p>
-          <a:p>
-            <a:pPr lvl="0" rtl="0">
-              <a:spcBef>
-                <a:spcPts val="0"/>
-              </a:spcBef>
-              <a:buNone/>
-            </a:pPr>
-            <a:endParaRPr/>
-          </a:p>
-          <a:p>
-            <a:pPr lvl="0" rtl="0">
-              <a:spcBef>
-                <a:spcPts val="0"/>
-              </a:spcBef>
-              <a:buNone/>
-            </a:pPr>
-            <a:endParaRPr/>
-          </a:p>
-          <a:p>
-            <a:pPr lvl="0" rtl="0">
-              <a:spcBef>
-                <a:spcPts val="0"/>
-              </a:spcBef>
-              <a:buNone/>
-            </a:pPr>
-            <a:endParaRPr/>
-          </a:p>
-          <a:p>
-            <a:pPr lvl="0" rtl="0">
-              <a:spcBef>
-                <a:spcPts val="0"/>
-              </a:spcBef>
-              <a:buNone/>
-            </a:pPr>
-            <a:endParaRPr/>
-          </a:p>
-          <a:p>
-            <a:pPr lvl="0" rtl="0">
-              <a:spcBef>
-                <a:spcPts val="0"/>
-              </a:spcBef>
-              <a:buNone/>
-            </a:pPr>
-            <a:endParaRPr sz="1100">
-              <a:solidFill>
-                <a:srgbClr val="FFFFFF"/>
-              </a:solidFill>
-            </a:endParaRPr>
-          </a:p>
-          <a:p>
-            <a:pPr lvl="0" rtl="0">
-              <a:spcBef>
-                <a:spcPts val="0"/>
-              </a:spcBef>
-              <a:buNone/>
-            </a:pPr>
-            <a:endParaRPr sz="1100">
-              <a:solidFill>
-                <a:srgbClr val="FFFFFF"/>
-              </a:solidFill>
-            </a:endParaRPr>
-          </a:p>
-          <a:p>
-            <a:pPr lvl="0" rtl="0">
-              <a:spcBef>
-                <a:spcPts val="0"/>
-              </a:spcBef>
-              <a:buNone/>
-            </a:pPr>
-            <a:r>
-              <a:rPr lang="en" sz="1100">
-                <a:solidFill>
-                  <a:srgbClr val="FFFFFF"/>
-                </a:solidFill>
-              </a:rPr>
-              <a:t>2014-10-31                                                                            3</a:t>
-            </a:r>
-          </a:p>
-          <a:p>
-            <a:pPr lvl="0" rtl="0">
-              <a:spcBef>
-                <a:spcPts val="0"/>
-              </a:spcBef>
-              <a:buNone/>
-            </a:pPr>
-            <a:endParaRPr/>
-          </a:p>
-          <a:p>
-            <a:pPr lvl="0" rtl="0">
-              <a:spcBef>
-                <a:spcPts val="0"/>
-              </a:spcBef>
-              <a:buNone/>
-            </a:pPr>
-            <a:endParaRPr/>
-          </a:p>
-          <a:p>
-            <a:pPr lvl="0" rtl="0">
-              <a:spcBef>
-                <a:spcPts val="0"/>
-              </a:spcBef>
-              <a:buNone/>
-            </a:pPr>
-            <a:endParaRPr/>
-          </a:p>
-          <a:p>
-            <a:pPr lvl="0" rtl="0">
-              <a:spcBef>
-                <a:spcPts val="0"/>
-              </a:spcBef>
-              <a:buNone/>
-            </a:pPr>
-            <a:endParaRPr/>
-          </a:p>
-          <a:p>
-            <a:pPr lvl="0" rtl="0">
-              <a:spcBef>
-                <a:spcPts val="0"/>
-              </a:spcBef>
-              <a:buNone/>
-            </a:pPr>
-            <a:endParaRPr/>
-          </a:p>
-          <a:p>
-            <a:pPr lvl="0" rtl="0">
-              <a:spcBef>
-                <a:spcPts val="0"/>
-              </a:spcBef>
-              <a:buNone/>
-            </a:pPr>
-            <a:endParaRPr sz="1100">
-              <a:solidFill>
-                <a:srgbClr val="FFFFFF"/>
-              </a:solidFill>
-            </a:endParaRPr>
-          </a:p>
-        </p:txBody>
-      </p:sp>
-      <p:sp>
-        <p:nvSpPr>
           <p:cNvPr id="68" name="Shape 68"/>
           <p:cNvSpPr txBox="1">
             <a:spLocks noGrp="1"/>
@@ -5962,10 +6305,6 @@
           </p:nvPr>
         </p:nvSpPr>
         <p:spPr>
-          <a:xfrm>
-            <a:off x="457200" y="205978"/>
-            <a:ext cx="8229600" cy="994200"/>
-          </a:xfrm>
           <a:prstGeom prst="rect">
             <a:avLst/>
           </a:prstGeom>
@@ -6029,6 +6368,52 @@
           </a:ln>
         </p:spPr>
       </p:pic>
+      <p:sp>
+        <p:nvSpPr>
+          <p:cNvPr id="3" name="Date Placeholder 2"/>
+          <p:cNvSpPr>
+            <a:spLocks noGrp="1"/>
+          </p:cNvSpPr>
+          <p:nvPr>
+            <p:ph type="dt" sz="half" idx="10"/>
+          </p:nvPr>
+        </p:nvSpPr>
+        <p:spPr/>
+        <p:txBody>
+          <a:bodyPr/>
+          <a:lstStyle/>
+          <a:p>
+            <a:r>
+              <a:rPr lang="en-US" smtClean="0"/>
+              <a:t>2014-11-07</a:t>
+            </a:r>
+            <a:endParaRPr lang="en-US"/>
+          </a:p>
+        </p:txBody>
+      </p:sp>
+      <p:sp>
+        <p:nvSpPr>
+          <p:cNvPr id="4" name="Slide Number Placeholder 3"/>
+          <p:cNvSpPr>
+            <a:spLocks noGrp="1"/>
+          </p:cNvSpPr>
+          <p:nvPr>
+            <p:ph type="sldNum" sz="quarter" idx="12"/>
+          </p:nvPr>
+        </p:nvSpPr>
+        <p:spPr/>
+        <p:txBody>
+          <a:bodyPr/>
+          <a:lstStyle/>
+          <a:p>
+            <a:fld id="{E2A55E81-2818-4016-B972-9A1AED5F5395}" type="slidenum">
+              <a:rPr lang="en-US" smtClean="0"/>
+              <a:t>5</a:t>
+            </a:fld>
+            <a:endParaRPr lang="en-US"/>
+          </a:p>
+        </p:txBody>
+      </p:sp>
     </p:spTree>
   </p:cSld>
   <p:clrMapOvr>
@@ -6068,10 +6453,6 @@
           </p:nvPr>
         </p:nvSpPr>
         <p:spPr>
-          <a:xfrm>
-            <a:off x="457200" y="1244242"/>
-            <a:ext cx="8229600" cy="3630300"/>
-          </a:xfrm>
           <a:prstGeom prst="rect">
             <a:avLst/>
           </a:prstGeom>
@@ -6094,7 +6475,7 @@
               <a:buNone/>
             </a:pPr>
             <a:r>
-              <a:rPr lang="en" sz="1800"/>
+              <a:rPr lang="en" sz="1800" dirty="0"/>
               <a:t>100% Project Launch: 2012‐09‐21 </a:t>
             </a:r>
           </a:p>
@@ -6111,7 +6492,7 @@
               <a:buNone/>
             </a:pPr>
             <a:r>
-              <a:rPr lang="en" sz="1800"/>
+              <a:rPr lang="en" sz="1800" dirty="0"/>
               <a:t>100% Requirements Analysis / SRR: 2014‐10‐17</a:t>
             </a:r>
           </a:p>
@@ -6128,7 +6509,7 @@
               <a:buNone/>
             </a:pPr>
             <a:r>
-              <a:rPr lang="en" sz="1800"/>
+              <a:rPr lang="en" sz="1800" dirty="0"/>
               <a:t>100% System Design / SDR: 2014‐10‐31</a:t>
             </a:r>
           </a:p>
@@ -6145,8 +6526,16 @@
               <a:buNone/>
             </a:pPr>
             <a:r>
-              <a:rPr lang="en" sz="1800"/>
-              <a:t>10% Architectural Design / PDR: 2014‐11‐14</a:t>
+              <a:rPr lang="en" sz="1800" dirty="0" smtClean="0"/>
+              <a:t>90</a:t>
+            </a:r>
+            <a:r>
+              <a:rPr lang="en" sz="1800" dirty="0" smtClean="0"/>
+              <a:t>% </a:t>
+            </a:r>
+            <a:r>
+              <a:rPr lang="en" sz="1800" dirty="0"/>
+              <a:t>Architectural Design / PDR: 2014‐11‐14</a:t>
             </a:r>
           </a:p>
           <a:p>
@@ -6162,7 +6551,7 @@
               <a:buNone/>
             </a:pPr>
             <a:r>
-              <a:rPr lang="en" sz="1800"/>
+              <a:rPr lang="en" sz="1800" dirty="0"/>
               <a:t>0% Detailed Design / CDR: 2014‐12‐05</a:t>
             </a:r>
           </a:p>
@@ -6174,101 +6563,14 @@
               <a:buNone/>
             </a:pPr>
             <a:r>
-              <a:rPr lang="en" sz="1800"/>
-              <a:t>0% Interim Presentation: 2014‐12‐12</a:t>
+              <a:rPr lang="en" sz="1800" dirty="0"/>
+              <a:t>0% Interim Presentation: </a:t>
             </a:r>
-          </a:p>
-          <a:p>
-            <a:pPr lvl="0" rtl="0">
-              <a:spcBef>
-                <a:spcPts val="0"/>
-              </a:spcBef>
-              <a:buNone/>
-            </a:pPr>
-            <a:endParaRPr sz="1800"/>
-          </a:p>
-          <a:p>
-            <a:pPr lvl="0" rtl="0">
-              <a:spcBef>
-                <a:spcPts val="0"/>
-              </a:spcBef>
-              <a:buNone/>
-            </a:pPr>
-            <a:endParaRPr sz="1800"/>
-          </a:p>
-          <a:p>
-            <a:pPr lvl="0" rtl="0">
-              <a:spcBef>
-                <a:spcPts val="0"/>
-              </a:spcBef>
-              <a:buNone/>
-            </a:pPr>
-            <a:endParaRPr sz="1800"/>
-          </a:p>
-          <a:p>
-            <a:pPr lvl="0" rtl="0">
-              <a:spcBef>
-                <a:spcPts val="0"/>
-              </a:spcBef>
-              <a:buNone/>
-            </a:pPr>
-            <a:endParaRPr sz="1800"/>
-          </a:p>
-          <a:p>
-            <a:pPr lvl="0" rtl="0">
-              <a:spcBef>
-                <a:spcPts val="0"/>
-              </a:spcBef>
-              <a:buNone/>
-            </a:pPr>
-            <a:endParaRPr sz="1800"/>
-          </a:p>
-          <a:p>
-            <a:pPr lvl="0" rtl="0">
-              <a:spcBef>
-                <a:spcPts val="0"/>
-              </a:spcBef>
-              <a:buNone/>
-            </a:pPr>
-            <a:endParaRPr sz="1800"/>
-          </a:p>
-          <a:p>
-            <a:pPr lvl="0" rtl="0">
-              <a:spcBef>
-                <a:spcPts val="0"/>
-              </a:spcBef>
-              <a:buNone/>
-            </a:pPr>
             <a:r>
-              <a:rPr lang="en" sz="1100">
-                <a:solidFill>
-                  <a:schemeClr val="lt1"/>
-                </a:solidFill>
-              </a:rPr>
-              <a:t>2014-10-31                                                                           4</a:t>
+              <a:rPr lang="en" sz="1800" dirty="0" smtClean="0"/>
+              <a:t>2014‐12‐12</a:t>
             </a:r>
-          </a:p>
-          <a:p>
-            <a:pPr lvl="0" rtl="0">
-              <a:spcBef>
-                <a:spcPts val="0"/>
-              </a:spcBef>
-              <a:buClr>
-                <a:schemeClr val="dk1"/>
-              </a:buClr>
-              <a:buFont typeface="Arial"/>
-              <a:buNone/>
-            </a:pPr>
-            <a:endParaRPr sz="1800"/>
-          </a:p>
-          <a:p>
-            <a:pPr>
-              <a:spcBef>
-                <a:spcPts val="0"/>
-              </a:spcBef>
-              <a:buNone/>
-            </a:pPr>
-            <a:endParaRPr sz="1800"/>
+            <a:endParaRPr lang="en" sz="1800" dirty="0"/>
           </a:p>
         </p:txBody>
       </p:sp>
@@ -6283,10 +6585,6 @@
           </p:nvPr>
         </p:nvSpPr>
         <p:spPr>
-          <a:xfrm>
-            <a:off x="457200" y="205978"/>
-            <a:ext cx="8229600" cy="994200"/>
-          </a:xfrm>
           <a:prstGeom prst="rect">
             <a:avLst/>
           </a:prstGeom>
@@ -6304,7 +6602,7 @@
               <a:buNone/>
             </a:pPr>
             <a:r>
-              <a:rPr lang="en" sz="2400"/>
+              <a:rPr lang="en" sz="2400" dirty="0"/>
               <a:t>WCP52 USB Gain/Phase Analyzer</a:t>
             </a:r>
           </a:p>
@@ -6316,9 +6614,55 @@
               <a:buNone/>
             </a:pPr>
             <a:r>
-              <a:rPr lang="en" sz="2400"/>
+              <a:rPr lang="en" sz="2400" dirty="0"/>
               <a:t>Major Milestones Fall</a:t>
             </a:r>
+          </a:p>
+        </p:txBody>
+      </p:sp>
+      <p:sp>
+        <p:nvSpPr>
+          <p:cNvPr id="2" name="Date Placeholder 1"/>
+          <p:cNvSpPr>
+            <a:spLocks noGrp="1"/>
+          </p:cNvSpPr>
+          <p:nvPr>
+            <p:ph type="dt" sz="half" idx="10"/>
+          </p:nvPr>
+        </p:nvSpPr>
+        <p:spPr/>
+        <p:txBody>
+          <a:bodyPr/>
+          <a:lstStyle/>
+          <a:p>
+            <a:r>
+              <a:rPr lang="en-US" smtClean="0"/>
+              <a:t>2014-11-07</a:t>
+            </a:r>
+            <a:endParaRPr lang="en-US"/>
+          </a:p>
+        </p:txBody>
+      </p:sp>
+      <p:sp>
+        <p:nvSpPr>
+          <p:cNvPr id="3" name="Slide Number Placeholder 2"/>
+          <p:cNvSpPr>
+            <a:spLocks noGrp="1"/>
+          </p:cNvSpPr>
+          <p:nvPr>
+            <p:ph type="sldNum" sz="quarter" idx="12"/>
+          </p:nvPr>
+        </p:nvSpPr>
+        <p:spPr/>
+        <p:txBody>
+          <a:bodyPr/>
+          <a:lstStyle/>
+          <a:p>
+            <a:fld id="{E2A55E81-2818-4016-B972-9A1AED5F5395}" type="slidenum">
+              <a:rPr lang="en-US" smtClean="0"/>
+              <a:t>6</a:t>
+            </a:fld>
+            <a:endParaRPr lang="en-US"/>
           </a:p>
         </p:txBody>
       </p:sp>
@@ -6352,111 +6696,6 @@
       </p:grpSpPr>
       <p:sp>
         <p:nvSpPr>
-          <p:cNvPr id="80" name="Shape 80"/>
-          <p:cNvSpPr txBox="1">
-            <a:spLocks noGrp="1"/>
-          </p:cNvSpPr>
-          <p:nvPr>
-            <p:ph type="body" idx="1"/>
-          </p:nvPr>
-        </p:nvSpPr>
-        <p:spPr>
-          <a:xfrm>
-            <a:off x="457200" y="1244242"/>
-            <a:ext cx="8229600" cy="3630300"/>
-          </a:xfrm>
-          <a:prstGeom prst="rect">
-            <a:avLst/>
-          </a:prstGeom>
-        </p:spPr>
-        <p:txBody>
-          <a:bodyPr lIns="91425" tIns="91425" rIns="91425" bIns="91425" anchor="t" anchorCtr="0">
-            <a:noAutofit/>
-          </a:bodyPr>
-          <a:lstStyle/>
-          <a:p>
-            <a:pPr rtl="0">
-              <a:spcBef>
-                <a:spcPts val="0"/>
-              </a:spcBef>
-              <a:buNone/>
-            </a:pPr>
-            <a:endParaRPr dirty="0"/>
-          </a:p>
-          <a:p>
-            <a:pPr rtl="0">
-              <a:spcBef>
-                <a:spcPts val="0"/>
-              </a:spcBef>
-              <a:buNone/>
-            </a:pPr>
-            <a:endParaRPr dirty="0"/>
-          </a:p>
-          <a:p>
-            <a:pPr rtl="0">
-              <a:spcBef>
-                <a:spcPts val="0"/>
-              </a:spcBef>
-              <a:buNone/>
-            </a:pPr>
-            <a:endParaRPr dirty="0"/>
-          </a:p>
-          <a:p>
-            <a:pPr rtl="0">
-              <a:spcBef>
-                <a:spcPts val="0"/>
-              </a:spcBef>
-              <a:buNone/>
-            </a:pPr>
-            <a:endParaRPr dirty="0"/>
-          </a:p>
-          <a:p>
-            <a:pPr rtl="0">
-              <a:spcBef>
-                <a:spcPts val="0"/>
-              </a:spcBef>
-              <a:buNone/>
-            </a:pPr>
-            <a:endParaRPr dirty="0"/>
-          </a:p>
-          <a:p>
-            <a:pPr rtl="0">
-              <a:spcBef>
-                <a:spcPts val="0"/>
-              </a:spcBef>
-              <a:buNone/>
-            </a:pPr>
-            <a:endParaRPr dirty="0"/>
-          </a:p>
-          <a:p>
-            <a:pPr rtl="0">
-              <a:spcBef>
-                <a:spcPts val="0"/>
-              </a:spcBef>
-              <a:buNone/>
-            </a:pPr>
-            <a:endParaRPr dirty="0"/>
-          </a:p>
-          <a:p>
-            <a:pPr>
-              <a:spcBef>
-                <a:spcPts val="0"/>
-              </a:spcBef>
-              <a:buNone/>
-            </a:pPr>
-            <a:r>
-              <a:rPr lang="en" sz="1100" dirty="0">
-                <a:solidFill>
-                  <a:schemeClr val="lt1"/>
-                </a:solidFill>
-              </a:rPr>
-              <a:t>2014-10-31                                                                            5</a:t>
-            </a:r>
-          </a:p>
-        </p:txBody>
-      </p:sp>
-      <p:sp>
-        <p:nvSpPr>
           <p:cNvPr id="81" name="Shape 81"/>
           <p:cNvSpPr txBox="1">
             <a:spLocks noGrp="1"/>
@@ -6466,10 +6705,6 @@
           </p:nvPr>
         </p:nvSpPr>
         <p:spPr>
-          <a:xfrm>
-            <a:off x="457200" y="205978"/>
-            <a:ext cx="8229600" cy="994200"/>
-          </a:xfrm>
           <a:prstGeom prst="rect">
             <a:avLst/>
           </a:prstGeom>
@@ -6533,6 +6768,52 @@
           </a:ln>
         </p:spPr>
       </p:pic>
+      <p:sp>
+        <p:nvSpPr>
+          <p:cNvPr id="3" name="Date Placeholder 2"/>
+          <p:cNvSpPr>
+            <a:spLocks noGrp="1"/>
+          </p:cNvSpPr>
+          <p:nvPr>
+            <p:ph type="dt" sz="half" idx="10"/>
+          </p:nvPr>
+        </p:nvSpPr>
+        <p:spPr/>
+        <p:txBody>
+          <a:bodyPr/>
+          <a:lstStyle/>
+          <a:p>
+            <a:r>
+              <a:rPr lang="en-US" smtClean="0"/>
+              <a:t>2014-11-07</a:t>
+            </a:r>
+            <a:endParaRPr lang="en-US"/>
+          </a:p>
+        </p:txBody>
+      </p:sp>
+      <p:sp>
+        <p:nvSpPr>
+          <p:cNvPr id="4" name="Slide Number Placeholder 3"/>
+          <p:cNvSpPr>
+            <a:spLocks noGrp="1"/>
+          </p:cNvSpPr>
+          <p:nvPr>
+            <p:ph type="sldNum" sz="quarter" idx="12"/>
+          </p:nvPr>
+        </p:nvSpPr>
+        <p:spPr/>
+        <p:txBody>
+          <a:bodyPr/>
+          <a:lstStyle/>
+          <a:p>
+            <a:fld id="{E2A55E81-2818-4016-B972-9A1AED5F5395}" type="slidenum">
+              <a:rPr lang="en-US" smtClean="0"/>
+              <a:t>7</a:t>
+            </a:fld>
+            <a:endParaRPr lang="en-US"/>
+          </a:p>
+        </p:txBody>
+      </p:sp>
     </p:spTree>
   </p:cSld>
   <p:clrMapOvr>
@@ -6572,10 +6853,6 @@
           </p:nvPr>
         </p:nvSpPr>
         <p:spPr>
-          <a:xfrm>
-            <a:off x="457200" y="1244250"/>
-            <a:ext cx="8273699" cy="3703799"/>
-          </a:xfrm>
           <a:prstGeom prst="rect">
             <a:avLst/>
           </a:prstGeom>
@@ -6592,7 +6869,7 @@
               </a:spcBef>
               <a:buNone/>
             </a:pPr>
-            <a:endParaRPr sz="1800"/>
+            <a:endParaRPr sz="1800" dirty="0"/>
           </a:p>
           <a:p>
             <a:pPr marL="457200" lvl="0" indent="-342900" rtl="0">
@@ -6607,141 +6884,8 @@
               <a:buChar char="●"/>
             </a:pPr>
             <a:r>
-              <a:rPr lang="en" sz="1800"/>
+              <a:rPr lang="en" sz="1800" dirty="0"/>
               <a:t>Better understand how to interface with  the ATSAM4S16C microcontroller </a:t>
-            </a:r>
-          </a:p>
-          <a:p>
-            <a:pPr lvl="0" rtl="0">
-              <a:spcBef>
-                <a:spcPts val="0"/>
-              </a:spcBef>
-              <a:buNone/>
-            </a:pPr>
-            <a:r>
-              <a:rPr lang="en" sz="1800"/>
-              <a:t> </a:t>
-            </a:r>
-          </a:p>
-          <a:p>
-            <a:pPr rtl="0">
-              <a:spcBef>
-                <a:spcPts val="0"/>
-              </a:spcBef>
-              <a:buNone/>
-            </a:pPr>
-            <a:endParaRPr/>
-          </a:p>
-          <a:p>
-            <a:pPr rtl="0">
-              <a:spcBef>
-                <a:spcPts val="0"/>
-              </a:spcBef>
-              <a:buNone/>
-            </a:pPr>
-            <a:endParaRPr/>
-          </a:p>
-          <a:p>
-            <a:pPr rtl="0">
-              <a:spcBef>
-                <a:spcPts val="0"/>
-              </a:spcBef>
-              <a:buNone/>
-            </a:pPr>
-            <a:endParaRPr/>
-          </a:p>
-          <a:p>
-            <a:pPr rtl="0">
-              <a:spcBef>
-                <a:spcPts val="0"/>
-              </a:spcBef>
-              <a:buNone/>
-            </a:pPr>
-            <a:endParaRPr sz="1100">
-              <a:solidFill>
-                <a:schemeClr val="lt1"/>
-              </a:solidFill>
-            </a:endParaRPr>
-          </a:p>
-          <a:p>
-            <a:pPr rtl="0">
-              <a:spcBef>
-                <a:spcPts val="0"/>
-              </a:spcBef>
-              <a:buNone/>
-            </a:pPr>
-            <a:endParaRPr sz="1100">
-              <a:solidFill>
-                <a:schemeClr val="lt1"/>
-              </a:solidFill>
-            </a:endParaRPr>
-          </a:p>
-          <a:p>
-            <a:pPr rtl="0">
-              <a:spcBef>
-                <a:spcPts val="0"/>
-              </a:spcBef>
-              <a:buNone/>
-            </a:pPr>
-            <a:endParaRPr sz="1100">
-              <a:solidFill>
-                <a:schemeClr val="lt1"/>
-              </a:solidFill>
-            </a:endParaRPr>
-          </a:p>
-          <a:p>
-            <a:pPr rtl="0">
-              <a:spcBef>
-                <a:spcPts val="0"/>
-              </a:spcBef>
-              <a:buNone/>
-            </a:pPr>
-            <a:endParaRPr sz="1100">
-              <a:solidFill>
-                <a:schemeClr val="lt1"/>
-              </a:solidFill>
-            </a:endParaRPr>
-          </a:p>
-          <a:p>
-            <a:pPr rtl="0">
-              <a:spcBef>
-                <a:spcPts val="0"/>
-              </a:spcBef>
-              <a:buNone/>
-            </a:pPr>
-            <a:endParaRPr sz="1100">
-              <a:solidFill>
-                <a:schemeClr val="lt1"/>
-              </a:solidFill>
-            </a:endParaRPr>
-          </a:p>
-          <a:p>
-            <a:pPr rtl="0">
-              <a:spcBef>
-                <a:spcPts val="0"/>
-              </a:spcBef>
-              <a:buNone/>
-            </a:pPr>
-            <a:endParaRPr sz="1100">
-              <a:solidFill>
-                <a:schemeClr val="lt1"/>
-              </a:solidFill>
-            </a:endParaRPr>
-          </a:p>
-          <a:p>
-            <a:pPr>
-              <a:spcBef>
-                <a:spcPts val="0"/>
-              </a:spcBef>
-              <a:buNone/>
-            </a:pPr>
-            <a:r>
-              <a:rPr lang="en" sz="1100">
-                <a:solidFill>
-                  <a:schemeClr val="lt1"/>
-                </a:solidFill>
-              </a:rPr>
-              <a:t>2014-10-31                                                                      6</a:t>
             </a:r>
           </a:p>
         </p:txBody>
@@ -6757,10 +6901,6 @@
           </p:nvPr>
         </p:nvSpPr>
         <p:spPr>
-          <a:xfrm>
-            <a:off x="457200" y="205978"/>
-            <a:ext cx="8229600" cy="994200"/>
-          </a:xfrm>
           <a:prstGeom prst="rect">
             <a:avLst/>
           </a:prstGeom>
@@ -6793,6 +6933,52 @@
               <a:rPr lang="en" sz="2400"/>
               <a:t>Major Issues</a:t>
             </a:r>
+          </a:p>
+        </p:txBody>
+      </p:sp>
+      <p:sp>
+        <p:nvSpPr>
+          <p:cNvPr id="2" name="Date Placeholder 1"/>
+          <p:cNvSpPr>
+            <a:spLocks noGrp="1"/>
+          </p:cNvSpPr>
+          <p:nvPr>
+            <p:ph type="dt" sz="half" idx="10"/>
+          </p:nvPr>
+        </p:nvSpPr>
+        <p:spPr/>
+        <p:txBody>
+          <a:bodyPr/>
+          <a:lstStyle/>
+          <a:p>
+            <a:r>
+              <a:rPr lang="en-US" smtClean="0"/>
+              <a:t>2014-11-07</a:t>
+            </a:r>
+            <a:endParaRPr lang="en-US"/>
+          </a:p>
+        </p:txBody>
+      </p:sp>
+      <p:sp>
+        <p:nvSpPr>
+          <p:cNvPr id="3" name="Slide Number Placeholder 2"/>
+          <p:cNvSpPr>
+            <a:spLocks noGrp="1"/>
+          </p:cNvSpPr>
+          <p:nvPr>
+            <p:ph type="sldNum" sz="quarter" idx="12"/>
+          </p:nvPr>
+        </p:nvSpPr>
+        <p:spPr/>
+        <p:txBody>
+          <a:bodyPr/>
+          <a:lstStyle/>
+          <a:p>
+            <a:fld id="{E2A55E81-2818-4016-B972-9A1AED5F5395}" type="slidenum">
+              <a:rPr lang="en-US" smtClean="0"/>
+              <a:t>8</a:t>
+            </a:fld>
+            <a:endParaRPr lang="en-US"/>
           </a:p>
         </p:txBody>
       </p:sp>

</xml_diff>

<commit_message>
Updated budget in presentation
</commit_message>
<xml_diff>
--- a/wsr/StatusPres.pptx
+++ b/wsr/StatusPres.pptx
@@ -232,7 +232,7 @@
   </p:defaultTextStyle>
   <p:extLst>
     <p:ext uri="{EFAFB233-063F-42B5-8137-9DF3F51BA10A}">
-      <p15:sldGuideLst xmlns:p15="http://schemas.microsoft.com/office/powerpoint/2012/main" xmlns="">
+      <p15:sldGuideLst xmlns="" xmlns:p15="http://schemas.microsoft.com/office/powerpoint/2012/main">
         <p15:guide id="1" orient="horz" pos="1620">
           <p15:clr>
             <a:srgbClr val="A4A3A4"/>
@@ -2150,7 +2150,7 @@
           <a:p>
             <a:r>
               <a:rPr lang="en-US" smtClean="0"/>
-              <a:t>2014-11-21</a:t>
+              <a:t>2014-11-27</a:t>
             </a:r>
             <a:endParaRPr lang="en-US"/>
           </a:p>
@@ -2645,7 +2645,7 @@
           <a:p>
             <a:r>
               <a:rPr lang="en-US" smtClean="0"/>
-              <a:t>2014-11-21</a:t>
+              <a:t>2014-11-27</a:t>
             </a:r>
             <a:endParaRPr lang="en-US"/>
           </a:p>
@@ -3222,7 +3222,7 @@
           <a:p>
             <a:r>
               <a:rPr lang="en-US" smtClean="0"/>
-              <a:t>2014-11-21</a:t>
+              <a:t>2014-11-27</a:t>
             </a:r>
             <a:endParaRPr lang="en-US"/>
           </a:p>
@@ -3635,7 +3635,7 @@
           <a:p>
             <a:r>
               <a:rPr lang="en-US" smtClean="0"/>
-              <a:t>2014-11-21</a:t>
+              <a:t>2014-11-27</a:t>
             </a:r>
             <a:endParaRPr lang="en-US"/>
           </a:p>
@@ -4021,7 +4021,7 @@
           <a:p>
             <a:r>
               <a:rPr lang="en-US" smtClean="0"/>
-              <a:t>2014-11-21</a:t>
+              <a:t>2014-11-27</a:t>
             </a:r>
             <a:endParaRPr lang="en-US"/>
           </a:p>
@@ -4111,7 +4111,7 @@
           <a:p>
             <a:r>
               <a:rPr lang="en-US" smtClean="0"/>
-              <a:t>2014-11-21</a:t>
+              <a:t>2014-11-27</a:t>
             </a:r>
             <a:endParaRPr lang="en-US"/>
           </a:p>
@@ -4653,7 +4653,7 @@
           <a:p>
             <a:r>
               <a:rPr lang="en-US" smtClean="0"/>
-              <a:t>2014-11-21</a:t>
+              <a:t>2014-11-27</a:t>
             </a:r>
             <a:endParaRPr lang="en-US"/>
           </a:p>
@@ -5358,7 +5358,7 @@
           <a:p>
             <a:r>
               <a:rPr lang="en-US" smtClean="0"/>
-              <a:t>2014-11-21</a:t>
+              <a:t>2014-11-27</a:t>
             </a:r>
             <a:endParaRPr lang="en-US" dirty="0"/>
           </a:p>
@@ -5731,7 +5731,7 @@
           <a:p>
             <a:r>
               <a:rPr lang="en-US" smtClean="0"/>
-              <a:t>2014-11-21</a:t>
+              <a:t>2014-11-27</a:t>
             </a:r>
             <a:endParaRPr lang="en-US"/>
           </a:p>
@@ -5927,7 +5927,7 @@
           <a:p>
             <a:r>
               <a:rPr lang="en-US" smtClean="0"/>
-              <a:t>2014-11-21</a:t>
+              <a:t>2014-11-27</a:t>
             </a:r>
             <a:endParaRPr lang="en-US"/>
           </a:p>
@@ -6086,7 +6086,7 @@
           <a:p>
             <a:r>
               <a:rPr lang="en-US" smtClean="0"/>
-              <a:t>2014-11-21</a:t>
+              <a:t>2014-11-27</a:t>
             </a:r>
             <a:endParaRPr lang="en-US"/>
           </a:p>
@@ -6264,7 +6264,7 @@
           <a:p>
             <a:r>
               <a:rPr lang="en-US" smtClean="0"/>
-              <a:t>2014-11-21</a:t>
+              <a:t>2014-11-27</a:t>
             </a:r>
             <a:endParaRPr lang="en-US"/>
           </a:p>
@@ -6523,7 +6523,7 @@
           <a:p>
             <a:r>
               <a:rPr lang="en-US" smtClean="0"/>
-              <a:t>2014-11-21</a:t>
+              <a:t>2014-11-27</a:t>
             </a:r>
             <a:endParaRPr lang="en-US"/>
           </a:p>
@@ -6650,7 +6650,7 @@
           <a:p>
             <a:r>
               <a:rPr lang="en-US" smtClean="0"/>
-              <a:t>2014-11-21</a:t>
+              <a:t>2014-11-27</a:t>
             </a:r>
             <a:endParaRPr lang="en-US"/>
           </a:p>
@@ -6688,13 +6688,13 @@
           <p:nvPr>
             <p:extLst>
               <p:ext uri="{D42A27DB-BD31-4B8C-83A1-F6EECF244321}">
-                <p14:modId xmlns:p14="http://schemas.microsoft.com/office/powerpoint/2010/main" val="920583486"/>
+                <p14:modId xmlns:p14="http://schemas.microsoft.com/office/powerpoint/2010/main" val="2264297341"/>
               </p:ext>
             </p:extLst>
           </p:nvPr>
         </p:nvGraphicFramePr>
         <p:xfrm>
-          <a:off x="914400" y="1123950"/>
+          <a:off x="838200" y="1123950"/>
           <a:ext cx="7315200" cy="3337560"/>
         </p:xfrm>
         <a:graphic>
@@ -6899,7 +6899,7 @@
                       <a:pPr algn="r"/>
                       <a:r>
                         <a:rPr lang="en-US" dirty="0" smtClean="0"/>
-                        <a:t>$23</a:t>
+                        <a:t>$70</a:t>
                       </a:r>
                       <a:endParaRPr lang="en-US" dirty="0"/>
                     </a:p>
@@ -6914,7 +6914,7 @@
                       <a:pPr algn="r"/>
                       <a:r>
                         <a:rPr lang="en-US" dirty="0" smtClean="0"/>
-                        <a:t>$23</a:t>
+                        <a:t>$70</a:t>
                       </a:r>
                       <a:endParaRPr lang="en-US" dirty="0"/>
                     </a:p>
@@ -6929,7 +6929,7 @@
                       <a:pPr algn="r"/>
                       <a:r>
                         <a:rPr lang="en-US" dirty="0" smtClean="0"/>
-                        <a:t>$67</a:t>
+                        <a:t>$0</a:t>
                       </a:r>
                       <a:endParaRPr lang="en-US" dirty="0"/>
                     </a:p>
@@ -6944,7 +6944,7 @@
                       <a:pPr algn="r"/>
                       <a:r>
                         <a:rPr lang="en-US" dirty="0" smtClean="0"/>
-                        <a:t>$90</a:t>
+                        <a:t>$70</a:t>
                       </a:r>
                       <a:endParaRPr lang="en-US" dirty="0"/>
                     </a:p>
@@ -6975,7 +6975,7 @@
                       <a:pPr algn="r"/>
                       <a:r>
                         <a:rPr lang="en-US" dirty="0" smtClean="0"/>
-                        <a:t>$17</a:t>
+                        <a:t>$66</a:t>
                       </a:r>
                       <a:endParaRPr lang="en-US" dirty="0"/>
                     </a:p>
@@ -6990,7 +6990,7 @@
                       <a:pPr algn="r"/>
                       <a:r>
                         <a:rPr lang="en-US" dirty="0" smtClean="0"/>
-                        <a:t>$17</a:t>
+                        <a:t>$66</a:t>
                       </a:r>
                       <a:endParaRPr lang="en-US" dirty="0"/>
                     </a:p>
@@ -7005,7 +7005,7 @@
                       <a:pPr algn="r"/>
                       <a:r>
                         <a:rPr lang="en-US" dirty="0" smtClean="0"/>
-                        <a:t>$33</a:t>
+                        <a:t>$0</a:t>
                       </a:r>
                       <a:endParaRPr lang="en-US" dirty="0"/>
                     </a:p>
@@ -7020,7 +7020,7 @@
                       <a:pPr algn="r"/>
                       <a:r>
                         <a:rPr lang="en-US" dirty="0" smtClean="0"/>
-                        <a:t>$50</a:t>
+                        <a:t>$66</a:t>
                       </a:r>
                       <a:endParaRPr lang="en-US" dirty="0"/>
                     </a:p>
@@ -7077,7 +7077,7 @@
                       <a:pPr algn="r"/>
                       <a:r>
                         <a:rPr lang="en-US" dirty="0" smtClean="0"/>
-                        <a:t>$20</a:t>
+                        <a:t>$0</a:t>
                       </a:r>
                       <a:endParaRPr lang="en-US" dirty="0"/>
                     </a:p>
@@ -7092,7 +7092,7 @@
                       <a:pPr algn="r"/>
                       <a:r>
                         <a:rPr lang="en-US" dirty="0" smtClean="0"/>
-                        <a:t>$20</a:t>
+                        <a:t>$0</a:t>
                       </a:r>
                       <a:endParaRPr lang="en-US" dirty="0"/>
                     </a:p>
@@ -7343,22 +7343,11 @@
                       <a:pPr algn="r"/>
                       <a:r>
                         <a:rPr lang="en-US" dirty="0" smtClean="0"/>
-                        <a:t>$100</a:t>
+                        <a:t>$</a:t>
                       </a:r>
-                      <a:endParaRPr lang="en-US" dirty="0"/>
-                    </a:p>
-                  </a:txBody>
-                  <a:tcPr/>
-                </a:tc>
-                <a:tc>
-                  <a:txBody>
-                    <a:bodyPr/>
-                    <a:lstStyle/>
-                    <a:p>
-                      <a:pPr algn="r"/>
                       <a:r>
-                        <a:rPr lang="en-US" smtClean="0"/>
-                        <a:t>$100</a:t>
+                        <a:rPr lang="en-US" dirty="0" smtClean="0"/>
+                        <a:t>196</a:t>
                       </a:r>
                       <a:endParaRPr lang="en-US" dirty="0"/>
                     </a:p>
@@ -7373,7 +7362,7 @@
                       <a:pPr algn="r"/>
                       <a:r>
                         <a:rPr lang="en-US" dirty="0" smtClean="0"/>
-                        <a:t>$370</a:t>
+                        <a:t>$196</a:t>
                       </a:r>
                       <a:endParaRPr lang="en-US" dirty="0"/>
                     </a:p>
@@ -7388,7 +7377,22 @@
                       <a:pPr algn="r"/>
                       <a:r>
                         <a:rPr lang="en-US" dirty="0" smtClean="0"/>
-                        <a:t>$470</a:t>
+                        <a:t>$250</a:t>
+                      </a:r>
+                      <a:endParaRPr lang="en-US" dirty="0"/>
+                    </a:p>
+                  </a:txBody>
+                  <a:tcPr/>
+                </a:tc>
+                <a:tc>
+                  <a:txBody>
+                    <a:bodyPr/>
+                    <a:lstStyle/>
+                    <a:p>
+                      <a:pPr algn="r"/>
+                      <a:r>
+                        <a:rPr lang="en-US" dirty="0" smtClean="0"/>
+                        <a:t>$446</a:t>
                       </a:r>
                       <a:endParaRPr lang="en-US" dirty="0"/>
                     </a:p>
@@ -7478,28 +7482,7 @@
             </a:pPr>
             <a:r>
               <a:rPr lang="en" sz="1800" dirty="0" smtClean="0"/>
-              <a:t>Hardware is behind schedule. Considering pushing power supply design forward</a:t>
-            </a:r>
-            <a:r>
-              <a:rPr lang="en" sz="1800" dirty="0" smtClean="0"/>
-              <a:t>.</a:t>
-            </a:r>
-          </a:p>
-          <a:p>
-            <a:pPr marL="457200" lvl="0" indent="-342900" rtl="0">
-              <a:spcBef>
-                <a:spcPts val="0"/>
-              </a:spcBef>
-              <a:buClr>
-                <a:schemeClr val="dk2"/>
-              </a:buClr>
-              <a:buSzPct val="100000"/>
-              <a:buFont typeface="Trebuchet MS"/>
-              <a:buChar char="●"/>
-            </a:pPr>
-            <a:r>
-              <a:rPr lang="en" sz="1800" smtClean="0"/>
-              <a:t>Synthesizer interface is buggy.</a:t>
+              <a:t>Still need to fully characterize synthesizer</a:t>
             </a:r>
             <a:endParaRPr lang="en" sz="1800" dirty="0"/>
           </a:p>
@@ -7568,7 +7551,7 @@
           <a:p>
             <a:r>
               <a:rPr lang="en-US" smtClean="0"/>
-              <a:t>2014-11-21</a:t>
+              <a:t>2014-11-27</a:t>
             </a:r>
             <a:endParaRPr lang="en-US"/>
           </a:p>

</xml_diff>